<commit_message>
created sqlite db and modified data_gathering notebook
</commit_message>
<xml_diff>
--- a/presentation/group_9.pptx
+++ b/presentation/group_9.pptx
@@ -13,6 +13,7 @@
     <p:sldId id="262" r:id="rId7"/>
     <p:sldId id="263" r:id="rId8"/>
     <p:sldId id="261" r:id="rId9"/>
+    <p:sldId id="264" r:id="rId10"/>
   </p:sldIdLst>
   <p:sldSz cx="12192000" cy="6858000"/>
   <p:notesSz cx="6858000" cy="9144000"/>
@@ -111,6 +112,11 @@
       </a:defRPr>
     </a:lvl9pPr>
   </p:defaultTextStyle>
+  <p:extLst>
+    <p:ext uri="{EFAFB233-063F-42B5-8137-9DF3F51BA10A}">
+      <p15:sldGuideLst xmlns:p15="http://schemas.microsoft.com/office/powerpoint/2012/main"/>
+    </p:ext>
+  </p:extLst>
 </p:presentation>
 </file>
 
@@ -261,7 +267,7 @@
           <a:p>
             <a:fld id="{D5FBED5C-1F9A-9742-B246-A09B7E810F4B}" type="datetimeFigureOut">
               <a:rPr lang="en-US" smtClean="0"/>
-              <a:t>7/28/22</a:t>
+              <a:t>8/4/22</a:t>
             </a:fld>
             <a:endParaRPr lang="en-US"/>
           </a:p>
@@ -459,7 +465,7 @@
           <a:p>
             <a:fld id="{D5FBED5C-1F9A-9742-B246-A09B7E810F4B}" type="datetimeFigureOut">
               <a:rPr lang="en-US" smtClean="0"/>
-              <a:t>7/28/22</a:t>
+              <a:t>8/4/22</a:t>
             </a:fld>
             <a:endParaRPr lang="en-US"/>
           </a:p>
@@ -667,7 +673,7 @@
           <a:p>
             <a:fld id="{D5FBED5C-1F9A-9742-B246-A09B7E810F4B}" type="datetimeFigureOut">
               <a:rPr lang="en-US" smtClean="0"/>
-              <a:t>7/28/22</a:t>
+              <a:t>8/4/22</a:t>
             </a:fld>
             <a:endParaRPr lang="en-US"/>
           </a:p>
@@ -865,7 +871,7 @@
           <a:p>
             <a:fld id="{D5FBED5C-1F9A-9742-B246-A09B7E810F4B}" type="datetimeFigureOut">
               <a:rPr lang="en-US" smtClean="0"/>
-              <a:t>7/28/22</a:t>
+              <a:t>8/4/22</a:t>
             </a:fld>
             <a:endParaRPr lang="en-US"/>
           </a:p>
@@ -1140,7 +1146,7 @@
           <a:p>
             <a:fld id="{D5FBED5C-1F9A-9742-B246-A09B7E810F4B}" type="datetimeFigureOut">
               <a:rPr lang="en-US" smtClean="0"/>
-              <a:t>7/28/22</a:t>
+              <a:t>8/4/22</a:t>
             </a:fld>
             <a:endParaRPr lang="en-US"/>
           </a:p>
@@ -1405,7 +1411,7 @@
           <a:p>
             <a:fld id="{D5FBED5C-1F9A-9742-B246-A09B7E810F4B}" type="datetimeFigureOut">
               <a:rPr lang="en-US" smtClean="0"/>
-              <a:t>7/28/22</a:t>
+              <a:t>8/4/22</a:t>
             </a:fld>
             <a:endParaRPr lang="en-US"/>
           </a:p>
@@ -1817,7 +1823,7 @@
           <a:p>
             <a:fld id="{D5FBED5C-1F9A-9742-B246-A09B7E810F4B}" type="datetimeFigureOut">
               <a:rPr lang="en-US" smtClean="0"/>
-              <a:t>7/28/22</a:t>
+              <a:t>8/4/22</a:t>
             </a:fld>
             <a:endParaRPr lang="en-US"/>
           </a:p>
@@ -1958,7 +1964,7 @@
           <a:p>
             <a:fld id="{D5FBED5C-1F9A-9742-B246-A09B7E810F4B}" type="datetimeFigureOut">
               <a:rPr lang="en-US" smtClean="0"/>
-              <a:t>7/28/22</a:t>
+              <a:t>8/4/22</a:t>
             </a:fld>
             <a:endParaRPr lang="en-US"/>
           </a:p>
@@ -2071,7 +2077,7 @@
           <a:p>
             <a:fld id="{D5FBED5C-1F9A-9742-B246-A09B7E810F4B}" type="datetimeFigureOut">
               <a:rPr lang="en-US" smtClean="0"/>
-              <a:t>7/28/22</a:t>
+              <a:t>8/4/22</a:t>
             </a:fld>
             <a:endParaRPr lang="en-US"/>
           </a:p>
@@ -2382,7 +2388,7 @@
           <a:p>
             <a:fld id="{D5FBED5C-1F9A-9742-B246-A09B7E810F4B}" type="datetimeFigureOut">
               <a:rPr lang="en-US" smtClean="0"/>
-              <a:t>7/28/22</a:t>
+              <a:t>8/4/22</a:t>
             </a:fld>
             <a:endParaRPr lang="en-US"/>
           </a:p>
@@ -2670,7 +2676,7 @@
           <a:p>
             <a:fld id="{D5FBED5C-1F9A-9742-B246-A09B7E810F4B}" type="datetimeFigureOut">
               <a:rPr lang="en-US" smtClean="0"/>
-              <a:t>7/28/22</a:t>
+              <a:t>8/4/22</a:t>
             </a:fld>
             <a:endParaRPr lang="en-US"/>
           </a:p>
@@ -2911,7 +2917,7 @@
           <a:p>
             <a:fld id="{D5FBED5C-1F9A-9742-B246-A09B7E810F4B}" type="datetimeFigureOut">
               <a:rPr lang="en-US" smtClean="0"/>
-              <a:t>7/28/22</a:t>
+              <a:t>8/4/22</a:t>
             </a:fld>
             <a:endParaRPr lang="en-US"/>
           </a:p>
@@ -5854,14 +5860,14 @@
             <p:ph idx="1"/>
             <p:extLst>
               <p:ext uri="{D42A27DB-BD31-4B8C-83A1-F6EECF244321}">
-                <p14:modId xmlns:p14="http://schemas.microsoft.com/office/powerpoint/2010/main" val="763178545"/>
+                <p14:modId xmlns:p14="http://schemas.microsoft.com/office/powerpoint/2010/main" val="3593793378"/>
               </p:ext>
             </p:extLst>
           </p:nvPr>
         </p:nvGraphicFramePr>
         <p:xfrm>
           <a:off x="838200" y="1825625"/>
-          <a:ext cx="7067310" cy="1854200"/>
+          <a:ext cx="5653848" cy="1854200"/>
         </p:xfrm>
         <a:graphic>
           <a:graphicData uri="http://schemas.openxmlformats.org/drawingml/2006/table">
@@ -5898,13 +5904,6 @@
                     </a:ext>
                   </a:extLst>
                 </a:gridCol>
-                <a:gridCol w="1413462">
-                  <a:extLst>
-                    <a:ext uri="{9D8B030D-6E8A-4147-A177-3AD203B41FA5}">
-                      <a16:colId xmlns:a16="http://schemas.microsoft.com/office/drawing/2014/main" val="3418549700"/>
-                    </a:ext>
-                  </a:extLst>
-                </a:gridCol>
               </a:tblGrid>
               <a:tr h="370840">
                 <a:tc>
@@ -5954,19 +5953,6 @@
                       <a:r>
                         <a:rPr lang="en-US" dirty="0"/>
                         <a:t>Volume</a:t>
-                      </a:r>
-                    </a:p>
-                  </a:txBody>
-                  <a:tcPr/>
-                </a:tc>
-                <a:tc>
-                  <a:txBody>
-                    <a:bodyPr/>
-                    <a:lstStyle/>
-                    <a:p>
-                      <a:r>
-                        <a:rPr lang="en-US" dirty="0"/>
-                        <a:t>Market Cap</a:t>
                       </a:r>
                     </a:p>
                   </a:txBody>
@@ -6028,19 +6014,6 @@
                   </a:txBody>
                   <a:tcPr/>
                 </a:tc>
-                <a:tc>
-                  <a:txBody>
-                    <a:bodyPr/>
-                    <a:lstStyle/>
-                    <a:p>
-                      <a:r>
-                        <a:rPr lang="en-US" dirty="0"/>
-                        <a:t>Y</a:t>
-                      </a:r>
-                    </a:p>
-                  </a:txBody>
-                  <a:tcPr/>
-                </a:tc>
                 <a:extLst>
                   <a:ext uri="{0D108BD9-81ED-4DB2-BD59-A6C34878D82A}">
                     <a16:rowId xmlns:a16="http://schemas.microsoft.com/office/drawing/2014/main" val="2167841057"/>
@@ -6088,16 +6061,6 @@
                   </a:txBody>
                   <a:tcPr/>
                 </a:tc>
-                <a:tc>
-                  <a:txBody>
-                    <a:bodyPr/>
-                    <a:lstStyle/>
-                    <a:p>
-                      <a:endParaRPr lang="en-US"/>
-                    </a:p>
-                  </a:txBody>
-                  <a:tcPr/>
-                </a:tc>
                 <a:extLst>
                   <a:ext uri="{0D108BD9-81ED-4DB2-BD59-A6C34878D82A}">
                     <a16:rowId xmlns:a16="http://schemas.microsoft.com/office/drawing/2014/main" val="472582396"/>
@@ -6145,16 +6108,6 @@
                   </a:txBody>
                   <a:tcPr/>
                 </a:tc>
-                <a:tc>
-                  <a:txBody>
-                    <a:bodyPr/>
-                    <a:lstStyle/>
-                    <a:p>
-                      <a:endParaRPr lang="en-US"/>
-                    </a:p>
-                  </a:txBody>
-                  <a:tcPr/>
-                </a:tc>
                 <a:extLst>
                   <a:ext uri="{0D108BD9-81ED-4DB2-BD59-A6C34878D82A}">
                     <a16:rowId xmlns:a16="http://schemas.microsoft.com/office/drawing/2014/main" val="4231867581"/>
@@ -6168,16 +6121,6 @@
                     <a:lstStyle/>
                     <a:p>
                       <a:endParaRPr lang="en-US" dirty="0"/>
-                    </a:p>
-                  </a:txBody>
-                  <a:tcPr/>
-                </a:tc>
-                <a:tc>
-                  <a:txBody>
-                    <a:bodyPr/>
-                    <a:lstStyle/>
-                    <a:p>
-                      <a:endParaRPr lang="en-US"/>
                     </a:p>
                   </a:txBody>
                   <a:tcPr/>
@@ -6725,6 +6668,100 @@
     <p:extLst>
       <p:ext uri="{BB962C8B-B14F-4D97-AF65-F5344CB8AC3E}">
         <p14:creationId xmlns:p14="http://schemas.microsoft.com/office/powerpoint/2010/main" val="1172111218"/>
+      </p:ext>
+    </p:extLst>
+  </p:cSld>
+  <p:clrMapOvr>
+    <a:masterClrMapping/>
+  </p:clrMapOvr>
+</p:sld>
+</file>
+
+<file path=ppt/slides/slide9.xml><?xml version="1.0" encoding="utf-8"?>
+<p:sld xmlns:a="http://schemas.openxmlformats.org/drawingml/2006/main" xmlns:r="http://schemas.openxmlformats.org/officeDocument/2006/relationships" xmlns:p="http://schemas.openxmlformats.org/presentationml/2006/main">
+  <p:cSld>
+    <p:spTree>
+      <p:nvGrpSpPr>
+        <p:cNvPr id="1" name=""/>
+        <p:cNvGrpSpPr/>
+        <p:nvPr/>
+      </p:nvGrpSpPr>
+      <p:grpSpPr>
+        <a:xfrm>
+          <a:off x="0" y="0"/>
+          <a:ext cx="0" cy="0"/>
+          <a:chOff x="0" y="0"/>
+          <a:chExt cx="0" cy="0"/>
+        </a:xfrm>
+      </p:grpSpPr>
+      <p:sp>
+        <p:nvSpPr>
+          <p:cNvPr id="2" name="Title 1">
+            <a:extLst>
+              <a:ext uri="{FF2B5EF4-FFF2-40B4-BE49-F238E27FC236}">
+                <a16:creationId xmlns:a16="http://schemas.microsoft.com/office/drawing/2014/main" id="{8154058D-C77A-AE4A-95B2-A362D778CC05}"/>
+              </a:ext>
+            </a:extLst>
+          </p:cNvPr>
+          <p:cNvSpPr>
+            <a:spLocks noGrp="1"/>
+          </p:cNvSpPr>
+          <p:nvPr>
+            <p:ph type="title"/>
+          </p:nvPr>
+        </p:nvSpPr>
+        <p:spPr/>
+        <p:txBody>
+          <a:bodyPr/>
+          <a:lstStyle/>
+          <a:p>
+            <a:r>
+              <a:rPr lang="en-US" dirty="0"/>
+              <a:t>Technology Used</a:t>
+            </a:r>
+          </a:p>
+        </p:txBody>
+      </p:sp>
+      <p:sp>
+        <p:nvSpPr>
+          <p:cNvPr id="3" name="Content Placeholder 2">
+            <a:extLst>
+              <a:ext uri="{FF2B5EF4-FFF2-40B4-BE49-F238E27FC236}">
+                <a16:creationId xmlns:a16="http://schemas.microsoft.com/office/drawing/2014/main" id="{A58D8DC4-5CB3-094E-9492-8184F3114A09}"/>
+              </a:ext>
+            </a:extLst>
+          </p:cNvPr>
+          <p:cNvSpPr>
+            <a:spLocks noGrp="1"/>
+          </p:cNvSpPr>
+          <p:nvPr>
+            <p:ph idx="1"/>
+          </p:nvPr>
+        </p:nvSpPr>
+        <p:spPr/>
+        <p:txBody>
+          <a:bodyPr/>
+          <a:lstStyle/>
+          <a:p>
+            <a:r>
+              <a:rPr lang="en-US" dirty="0" err="1"/>
+              <a:t>yfinance</a:t>
+            </a:r>
+            <a:endParaRPr lang="en-US" dirty="0"/>
+          </a:p>
+          <a:p>
+            <a:pPr lvl="1"/>
+            <a:r>
+              <a:rPr lang="en-US" dirty="0"/>
+              <a:t>Used for pulling historical data</a:t>
+            </a:r>
+          </a:p>
+        </p:txBody>
+      </p:sp>
+    </p:spTree>
+    <p:extLst>
+      <p:ext uri="{BB962C8B-B14F-4D97-AF65-F5344CB8AC3E}">
+        <p14:creationId xmlns:p14="http://schemas.microsoft.com/office/powerpoint/2010/main" val="2299318546"/>
       </p:ext>
     </p:extLst>
   </p:cSld>

</xml_diff>

<commit_message>
updated ml model and ppt
</commit_message>
<xml_diff>
--- a/presentation/group_9.pptx
+++ b/presentation/group_9.pptx
@@ -10,10 +10,11 @@
     <p:sldId id="258" r:id="rId4"/>
     <p:sldId id="260" r:id="rId5"/>
     <p:sldId id="259" r:id="rId6"/>
-    <p:sldId id="262" r:id="rId7"/>
-    <p:sldId id="263" r:id="rId8"/>
-    <p:sldId id="261" r:id="rId9"/>
-    <p:sldId id="264" r:id="rId10"/>
+    <p:sldId id="265" r:id="rId7"/>
+    <p:sldId id="262" r:id="rId8"/>
+    <p:sldId id="263" r:id="rId9"/>
+    <p:sldId id="261" r:id="rId10"/>
+    <p:sldId id="264" r:id="rId11"/>
   </p:sldIdLst>
   <p:sldSz cx="12192000" cy="6858000"/>
   <p:notesSz cx="6858000" cy="9144000"/>
@@ -3397,6 +3398,100 @@
 </p:sld>
 </file>
 
+<file path=ppt/slides/slide10.xml><?xml version="1.0" encoding="utf-8"?>
+<p:sld xmlns:a="http://schemas.openxmlformats.org/drawingml/2006/main" xmlns:r="http://schemas.openxmlformats.org/officeDocument/2006/relationships" xmlns:p="http://schemas.openxmlformats.org/presentationml/2006/main">
+  <p:cSld>
+    <p:spTree>
+      <p:nvGrpSpPr>
+        <p:cNvPr id="1" name=""/>
+        <p:cNvGrpSpPr/>
+        <p:nvPr/>
+      </p:nvGrpSpPr>
+      <p:grpSpPr>
+        <a:xfrm>
+          <a:off x="0" y="0"/>
+          <a:ext cx="0" cy="0"/>
+          <a:chOff x="0" y="0"/>
+          <a:chExt cx="0" cy="0"/>
+        </a:xfrm>
+      </p:grpSpPr>
+      <p:sp>
+        <p:nvSpPr>
+          <p:cNvPr id="2" name="Title 1">
+            <a:extLst>
+              <a:ext uri="{FF2B5EF4-FFF2-40B4-BE49-F238E27FC236}">
+                <a16:creationId xmlns:a16="http://schemas.microsoft.com/office/drawing/2014/main" id="{8154058D-C77A-AE4A-95B2-A362D778CC05}"/>
+              </a:ext>
+            </a:extLst>
+          </p:cNvPr>
+          <p:cNvSpPr>
+            <a:spLocks noGrp="1"/>
+          </p:cNvSpPr>
+          <p:nvPr>
+            <p:ph type="title"/>
+          </p:nvPr>
+        </p:nvSpPr>
+        <p:spPr/>
+        <p:txBody>
+          <a:bodyPr/>
+          <a:lstStyle/>
+          <a:p>
+            <a:r>
+              <a:rPr lang="en-US" dirty="0"/>
+              <a:t>Technology Used</a:t>
+            </a:r>
+          </a:p>
+        </p:txBody>
+      </p:sp>
+      <p:sp>
+        <p:nvSpPr>
+          <p:cNvPr id="3" name="Content Placeholder 2">
+            <a:extLst>
+              <a:ext uri="{FF2B5EF4-FFF2-40B4-BE49-F238E27FC236}">
+                <a16:creationId xmlns:a16="http://schemas.microsoft.com/office/drawing/2014/main" id="{A58D8DC4-5CB3-094E-9492-8184F3114A09}"/>
+              </a:ext>
+            </a:extLst>
+          </p:cNvPr>
+          <p:cNvSpPr>
+            <a:spLocks noGrp="1"/>
+          </p:cNvSpPr>
+          <p:nvPr>
+            <p:ph idx="1"/>
+          </p:nvPr>
+        </p:nvSpPr>
+        <p:spPr/>
+        <p:txBody>
+          <a:bodyPr/>
+          <a:lstStyle/>
+          <a:p>
+            <a:r>
+              <a:rPr lang="en-US" dirty="0" err="1"/>
+              <a:t>yfinance</a:t>
+            </a:r>
+            <a:endParaRPr lang="en-US" dirty="0"/>
+          </a:p>
+          <a:p>
+            <a:pPr lvl="1"/>
+            <a:r>
+              <a:rPr lang="en-US" dirty="0"/>
+              <a:t>Used for pulling historical data</a:t>
+            </a:r>
+          </a:p>
+        </p:txBody>
+      </p:sp>
+    </p:spTree>
+    <p:extLst>
+      <p:ext uri="{BB962C8B-B14F-4D97-AF65-F5344CB8AC3E}">
+        <p14:creationId xmlns:p14="http://schemas.microsoft.com/office/powerpoint/2010/main" val="2299318546"/>
+      </p:ext>
+    </p:extLst>
+  </p:cSld>
+  <p:clrMapOvr>
+    <a:masterClrMapping/>
+  </p:clrMapOvr>
+</p:sld>
+</file>
+
 <file path=ppt/slides/slide2.xml><?xml version="1.0" encoding="utf-8"?>
 <p:sld xmlns:a="http://schemas.openxmlformats.org/drawingml/2006/main" xmlns:r="http://schemas.openxmlformats.org/officeDocument/2006/relationships" xmlns:p="http://schemas.openxmlformats.org/presentationml/2006/main">
   <p:cSld>
@@ -4470,7 +4565,7 @@
           <p:nvPr>
             <p:extLst>
               <p:ext uri="{D42A27DB-BD31-4B8C-83A1-F6EECF244321}">
-                <p14:modId xmlns:p14="http://schemas.microsoft.com/office/powerpoint/2010/main" val="3886740272"/>
+                <p14:modId xmlns:p14="http://schemas.microsoft.com/office/powerpoint/2010/main" val="1960550101"/>
               </p:ext>
             </p:extLst>
           </p:nvPr>
@@ -5821,6 +5916,91 @@
           <p:cNvPr id="2" name="Title 1">
             <a:extLst>
               <a:ext uri="{FF2B5EF4-FFF2-40B4-BE49-F238E27FC236}">
+                <a16:creationId xmlns:a16="http://schemas.microsoft.com/office/drawing/2014/main" id="{23A43887-CE2E-A44C-88DC-B880E15B2123}"/>
+              </a:ext>
+            </a:extLst>
+          </p:cNvPr>
+          <p:cNvSpPr>
+            <a:spLocks noGrp="1"/>
+          </p:cNvSpPr>
+          <p:nvPr>
+            <p:ph type="title"/>
+          </p:nvPr>
+        </p:nvSpPr>
+        <p:spPr/>
+        <p:txBody>
+          <a:bodyPr/>
+          <a:lstStyle/>
+          <a:p>
+            <a:endParaRPr lang="en-US"/>
+          </a:p>
+        </p:txBody>
+      </p:sp>
+      <p:pic>
+        <p:nvPicPr>
+          <p:cNvPr id="4" name="Picture 3">
+            <a:extLst>
+              <a:ext uri="{FF2B5EF4-FFF2-40B4-BE49-F238E27FC236}">
+                <a16:creationId xmlns:a16="http://schemas.microsoft.com/office/drawing/2014/main" id="{0F84CE5A-EC05-3844-BE24-A5746DFCC856}"/>
+              </a:ext>
+            </a:extLst>
+          </p:cNvPr>
+          <p:cNvPicPr>
+            <a:picLocks noChangeAspect="1"/>
+          </p:cNvPicPr>
+          <p:nvPr/>
+        </p:nvPicPr>
+        <p:blipFill>
+          <a:blip r:embed="rId2"/>
+          <a:stretch>
+            <a:fillRect/>
+          </a:stretch>
+        </p:blipFill>
+        <p:spPr>
+          <a:xfrm>
+            <a:off x="2646929" y="1747838"/>
+            <a:ext cx="6898141" cy="4550606"/>
+          </a:xfrm>
+          <a:prstGeom prst="rect">
+            <a:avLst/>
+          </a:prstGeom>
+        </p:spPr>
+      </p:pic>
+    </p:spTree>
+    <p:extLst>
+      <p:ext uri="{BB962C8B-B14F-4D97-AF65-F5344CB8AC3E}">
+        <p14:creationId xmlns:p14="http://schemas.microsoft.com/office/powerpoint/2010/main" val="4099293040"/>
+      </p:ext>
+    </p:extLst>
+  </p:cSld>
+  <p:clrMapOvr>
+    <a:masterClrMapping/>
+  </p:clrMapOvr>
+</p:sld>
+</file>
+
+<file path=ppt/slides/slide7.xml><?xml version="1.0" encoding="utf-8"?>
+<p:sld xmlns:a="http://schemas.openxmlformats.org/drawingml/2006/main" xmlns:r="http://schemas.openxmlformats.org/officeDocument/2006/relationships" xmlns:p="http://schemas.openxmlformats.org/presentationml/2006/main">
+  <p:cSld>
+    <p:spTree>
+      <p:nvGrpSpPr>
+        <p:cNvPr id="1" name=""/>
+        <p:cNvGrpSpPr/>
+        <p:nvPr/>
+      </p:nvGrpSpPr>
+      <p:grpSpPr>
+        <a:xfrm>
+          <a:off x="0" y="0"/>
+          <a:ext cx="0" cy="0"/>
+          <a:chOff x="0" y="0"/>
+          <a:chExt cx="0" cy="0"/>
+        </a:xfrm>
+      </p:grpSpPr>
+      <p:sp>
+        <p:nvSpPr>
+          <p:cNvPr id="2" name="Title 1">
+            <a:extLst>
+              <a:ext uri="{FF2B5EF4-FFF2-40B4-BE49-F238E27FC236}">
                 <a16:creationId xmlns:a16="http://schemas.microsoft.com/office/drawing/2014/main" id="{5E855371-0FCD-9647-ADF5-C7FEAF9AAF04}"/>
               </a:ext>
             </a:extLst>
@@ -6375,116 +6555,6 @@
 </p:sld>
 </file>
 
-<file path=ppt/slides/slide7.xml><?xml version="1.0" encoding="utf-8"?>
-<p:sld xmlns:a="http://schemas.openxmlformats.org/drawingml/2006/main" xmlns:r="http://schemas.openxmlformats.org/officeDocument/2006/relationships" xmlns:p="http://schemas.openxmlformats.org/presentationml/2006/main">
-  <p:cSld>
-    <p:spTree>
-      <p:nvGrpSpPr>
-        <p:cNvPr id="1" name=""/>
-        <p:cNvGrpSpPr/>
-        <p:nvPr/>
-      </p:nvGrpSpPr>
-      <p:grpSpPr>
-        <a:xfrm>
-          <a:off x="0" y="0"/>
-          <a:ext cx="0" cy="0"/>
-          <a:chOff x="0" y="0"/>
-          <a:chExt cx="0" cy="0"/>
-        </a:xfrm>
-      </p:grpSpPr>
-      <p:sp>
-        <p:nvSpPr>
-          <p:cNvPr id="2" name="Title 1">
-            <a:extLst>
-              <a:ext uri="{FF2B5EF4-FFF2-40B4-BE49-F238E27FC236}">
-                <a16:creationId xmlns:a16="http://schemas.microsoft.com/office/drawing/2014/main" id="{15352757-677C-054F-AEB7-1CE1BBA39EA1}"/>
-              </a:ext>
-            </a:extLst>
-          </p:cNvPr>
-          <p:cNvSpPr>
-            <a:spLocks noGrp="1"/>
-          </p:cNvSpPr>
-          <p:nvPr>
-            <p:ph type="title"/>
-          </p:nvPr>
-        </p:nvSpPr>
-        <p:spPr/>
-        <p:txBody>
-          <a:bodyPr/>
-          <a:lstStyle/>
-          <a:p>
-            <a:r>
-              <a:rPr lang="en-US" dirty="0"/>
-              <a:t>Run</a:t>
-            </a:r>
-          </a:p>
-        </p:txBody>
-      </p:sp>
-      <p:sp>
-        <p:nvSpPr>
-          <p:cNvPr id="3" name="Content Placeholder 2">
-            <a:extLst>
-              <a:ext uri="{FF2B5EF4-FFF2-40B4-BE49-F238E27FC236}">
-                <a16:creationId xmlns:a16="http://schemas.microsoft.com/office/drawing/2014/main" id="{5537C8CC-07A9-0C47-B94E-53F3C3B6B2FE}"/>
-              </a:ext>
-            </a:extLst>
-          </p:cNvPr>
-          <p:cNvSpPr>
-            <a:spLocks noGrp="1"/>
-          </p:cNvSpPr>
-          <p:nvPr>
-            <p:ph idx="1"/>
-          </p:nvPr>
-        </p:nvSpPr>
-        <p:spPr/>
-        <p:txBody>
-          <a:bodyPr/>
-          <a:lstStyle/>
-          <a:p>
-            <a:r>
-              <a:rPr lang="en-US" dirty="0"/>
-              <a:t>Fetch current price via API</a:t>
-            </a:r>
-          </a:p>
-          <a:p>
-            <a:r>
-              <a:rPr lang="en-US" dirty="0"/>
-              <a:t>Query historical data</a:t>
-            </a:r>
-          </a:p>
-          <a:p>
-            <a:r>
-              <a:rPr lang="en-US" dirty="0"/>
-              <a:t>Create training data</a:t>
-            </a:r>
-          </a:p>
-          <a:p>
-            <a:r>
-              <a:rPr lang="en-US" dirty="0"/>
-              <a:t>Trains model</a:t>
-            </a:r>
-          </a:p>
-          <a:p>
-            <a:r>
-              <a:rPr lang="en-US" dirty="0"/>
-              <a:t>Predicts next day price</a:t>
-            </a:r>
-          </a:p>
-        </p:txBody>
-      </p:sp>
-    </p:spTree>
-    <p:extLst>
-      <p:ext uri="{BB962C8B-B14F-4D97-AF65-F5344CB8AC3E}">
-        <p14:creationId xmlns:p14="http://schemas.microsoft.com/office/powerpoint/2010/main" val="756946621"/>
-      </p:ext>
-    </p:extLst>
-  </p:cSld>
-  <p:clrMapOvr>
-    <a:masterClrMapping/>
-  </p:clrMapOvr>
-</p:sld>
-</file>
-
 <file path=ppt/slides/slide8.xml><?xml version="1.0" encoding="utf-8"?>
 <p:sld xmlns:a="http://schemas.openxmlformats.org/drawingml/2006/main" xmlns:r="http://schemas.openxmlformats.org/officeDocument/2006/relationships" xmlns:p="http://schemas.openxmlformats.org/presentationml/2006/main">
   <p:cSld>
@@ -6507,7 +6577,7 @@
           <p:cNvPr id="2" name="Title 1">
             <a:extLst>
               <a:ext uri="{FF2B5EF4-FFF2-40B4-BE49-F238E27FC236}">
-                <a16:creationId xmlns:a16="http://schemas.microsoft.com/office/drawing/2014/main" id="{E58E1E87-57C3-E74D-831C-8A547E93C6DD}"/>
+                <a16:creationId xmlns:a16="http://schemas.microsoft.com/office/drawing/2014/main" id="{15352757-677C-054F-AEB7-1CE1BBA39EA1}"/>
               </a:ext>
             </a:extLst>
           </p:cNvPr>
@@ -6523,7 +6593,10 @@
           <a:bodyPr/>
           <a:lstStyle/>
           <a:p>
-            <a:endParaRPr lang="en-US"/>
+            <a:r>
+              <a:rPr lang="en-US" dirty="0"/>
+              <a:t>Run</a:t>
+            </a:r>
           </a:p>
         </p:txBody>
       </p:sp>
@@ -6532,7 +6605,7 @@
           <p:cNvPr id="3" name="Content Placeholder 2">
             <a:extLst>
               <a:ext uri="{FF2B5EF4-FFF2-40B4-BE49-F238E27FC236}">
-                <a16:creationId xmlns:a16="http://schemas.microsoft.com/office/drawing/2014/main" id="{40E4355E-C110-C944-8B22-D46F49CB0BCD}"/>
+                <a16:creationId xmlns:a16="http://schemas.microsoft.com/office/drawing/2014/main" id="{5537C8CC-07A9-0C47-B94E-53F3C3B6B2FE}"/>
               </a:ext>
             </a:extLst>
           </p:cNvPr>
@@ -6545,121 +6618,36 @@
         </p:nvSpPr>
         <p:spPr/>
         <p:txBody>
-          <a:bodyPr>
-            <a:normAutofit fontScale="92500" lnSpcReduction="20000"/>
-          </a:bodyPr>
-          <a:lstStyle/>
-          <a:p>
-            <a:pPr marL="514350" indent="-514350">
-              <a:buFont typeface="+mj-lt"/>
-              <a:buAutoNum type="arabicPeriod"/>
-            </a:pPr>
+          <a:bodyPr/>
+          <a:lstStyle/>
+          <a:p>
             <a:r>
               <a:rPr lang="en-US" dirty="0"/>
-              <a:t>Save data into DB</a:t>
-            </a:r>
-          </a:p>
-          <a:p>
-            <a:pPr lvl="1"/>
+              <a:t>Fetch current price via API</a:t>
+            </a:r>
+          </a:p>
+          <a:p>
             <a:r>
               <a:rPr lang="en-US" dirty="0"/>
-              <a:t>Put all data in one place</a:t>
-            </a:r>
-          </a:p>
-          <a:p>
-            <a:pPr marL="514350" indent="-514350">
-              <a:buFont typeface="+mj-lt"/>
-              <a:buAutoNum type="arabicPeriod"/>
-            </a:pPr>
+              <a:t>Query historical data</a:t>
+            </a:r>
+          </a:p>
+          <a:p>
             <a:r>
               <a:rPr lang="en-US" dirty="0"/>
-              <a:t>Build model on 1 ticker</a:t>
-            </a:r>
-          </a:p>
-          <a:p>
-            <a:pPr marL="514350" indent="-514350">
-              <a:buFont typeface="+mj-lt"/>
-              <a:buAutoNum type="arabicPeriod"/>
-            </a:pPr>
+              <a:t>Create training data</a:t>
+            </a:r>
+          </a:p>
+          <a:p>
             <a:r>
               <a:rPr lang="en-US" dirty="0"/>
-              <a:t>Outline dashboard </a:t>
-            </a:r>
-            <a:r>
-              <a:rPr lang="en-US" b="1" dirty="0"/>
-              <a:t>✔</a:t>
-            </a:r>
-          </a:p>
-          <a:p>
-            <a:pPr marL="514350" indent="-514350">
-              <a:buFont typeface="+mj-lt"/>
-              <a:buAutoNum type="arabicPeriod"/>
-            </a:pPr>
+              <a:t>Trains model</a:t>
+            </a:r>
+          </a:p>
+          <a:p>
             <a:r>
               <a:rPr lang="en-US" dirty="0"/>
-              <a:t>Git repo</a:t>
-            </a:r>
-          </a:p>
-          <a:p>
-            <a:pPr marL="514350" indent="-514350">
-              <a:buFont typeface="+mj-lt"/>
-              <a:buAutoNum type="arabicPeriod"/>
-            </a:pPr>
-            <a:endParaRPr lang="en-US" dirty="0"/>
-          </a:p>
-          <a:p>
-            <a:pPr marL="514350" indent="-514350">
-              <a:buFont typeface="+mj-lt"/>
-              <a:buAutoNum type="arabicPeriod"/>
-            </a:pPr>
-            <a:r>
-              <a:rPr lang="en-US" dirty="0"/>
-              <a:t>Define function to calculate volatility (vs. BTC)</a:t>
-            </a:r>
-          </a:p>
-          <a:p>
-            <a:pPr lvl="1"/>
-            <a:r>
-              <a:rPr lang="en-US" dirty="0"/>
-              <a:t>Decide time frame or make it a parameter</a:t>
-            </a:r>
-          </a:p>
-          <a:p>
-            <a:pPr marL="514350" indent="-514350">
-              <a:buFont typeface="+mj-lt"/>
-              <a:buAutoNum type="arabicPeriod"/>
-            </a:pPr>
-            <a:r>
-              <a:rPr lang="en-US" dirty="0"/>
-              <a:t>Define function to plot</a:t>
-            </a:r>
-          </a:p>
-          <a:p>
-            <a:pPr marL="514350" indent="-514350">
-              <a:buFont typeface="+mj-lt"/>
-              <a:buAutoNum type="arabicPeriod"/>
-            </a:pPr>
-            <a:r>
-              <a:rPr lang="en-US" dirty="0"/>
-              <a:t>Build the HTML</a:t>
-            </a:r>
-          </a:p>
-          <a:p>
-            <a:pPr marL="514350" indent="-514350">
-              <a:buFont typeface="+mj-lt"/>
-              <a:buAutoNum type="arabicPeriod"/>
-            </a:pPr>
-            <a:r>
-              <a:rPr lang="en-US" dirty="0"/>
-              <a:t>Explore </a:t>
-            </a:r>
-            <a:r>
-              <a:rPr lang="en-US" dirty="0" err="1"/>
-              <a:t>yfinance</a:t>
-            </a:r>
-            <a:r>
-              <a:rPr lang="en-US" dirty="0"/>
-              <a:t> </a:t>
+              <a:t>Predicts next day price</a:t>
             </a:r>
           </a:p>
         </p:txBody>
@@ -6667,7 +6655,7 @@
     </p:spTree>
     <p:extLst>
       <p:ext uri="{BB962C8B-B14F-4D97-AF65-F5344CB8AC3E}">
-        <p14:creationId xmlns:p14="http://schemas.microsoft.com/office/powerpoint/2010/main" val="1172111218"/>
+        <p14:creationId xmlns:p14="http://schemas.microsoft.com/office/powerpoint/2010/main" val="756946621"/>
       </p:ext>
     </p:extLst>
   </p:cSld>
@@ -6699,7 +6687,7 @@
           <p:cNvPr id="2" name="Title 1">
             <a:extLst>
               <a:ext uri="{FF2B5EF4-FFF2-40B4-BE49-F238E27FC236}">
-                <a16:creationId xmlns:a16="http://schemas.microsoft.com/office/drawing/2014/main" id="{8154058D-C77A-AE4A-95B2-A362D778CC05}"/>
+                <a16:creationId xmlns:a16="http://schemas.microsoft.com/office/drawing/2014/main" id="{E58E1E87-57C3-E74D-831C-8A547E93C6DD}"/>
               </a:ext>
             </a:extLst>
           </p:cNvPr>
@@ -6715,45 +6703,143 @@
           <a:bodyPr/>
           <a:lstStyle/>
           <a:p>
+            <a:endParaRPr lang="en-US"/>
+          </a:p>
+        </p:txBody>
+      </p:sp>
+      <p:sp>
+        <p:nvSpPr>
+          <p:cNvPr id="3" name="Content Placeholder 2">
+            <a:extLst>
+              <a:ext uri="{FF2B5EF4-FFF2-40B4-BE49-F238E27FC236}">
+                <a16:creationId xmlns:a16="http://schemas.microsoft.com/office/drawing/2014/main" id="{40E4355E-C110-C944-8B22-D46F49CB0BCD}"/>
+              </a:ext>
+            </a:extLst>
+          </p:cNvPr>
+          <p:cNvSpPr>
+            <a:spLocks noGrp="1"/>
+          </p:cNvSpPr>
+          <p:nvPr>
+            <p:ph idx="1"/>
+          </p:nvPr>
+        </p:nvSpPr>
+        <p:spPr/>
+        <p:txBody>
+          <a:bodyPr>
+            <a:normAutofit fontScale="92500" lnSpcReduction="20000"/>
+          </a:bodyPr>
+          <a:lstStyle/>
+          <a:p>
+            <a:pPr marL="514350" indent="-514350">
+              <a:buFont typeface="+mj-lt"/>
+              <a:buAutoNum type="arabicPeriod"/>
+            </a:pPr>
             <a:r>
               <a:rPr lang="en-US" dirty="0"/>
-              <a:t>Technology Used</a:t>
-            </a:r>
-          </a:p>
-        </p:txBody>
-      </p:sp>
-      <p:sp>
-        <p:nvSpPr>
-          <p:cNvPr id="3" name="Content Placeholder 2">
-            <a:extLst>
-              <a:ext uri="{FF2B5EF4-FFF2-40B4-BE49-F238E27FC236}">
-                <a16:creationId xmlns:a16="http://schemas.microsoft.com/office/drawing/2014/main" id="{A58D8DC4-5CB3-094E-9492-8184F3114A09}"/>
-              </a:ext>
-            </a:extLst>
-          </p:cNvPr>
-          <p:cNvSpPr>
-            <a:spLocks noGrp="1"/>
-          </p:cNvSpPr>
-          <p:nvPr>
-            <p:ph idx="1"/>
-          </p:nvPr>
-        </p:nvSpPr>
-        <p:spPr/>
-        <p:txBody>
-          <a:bodyPr/>
-          <a:lstStyle/>
-          <a:p>
+              <a:t>Save data into DB</a:t>
+            </a:r>
+          </a:p>
+          <a:p>
+            <a:pPr lvl="1"/>
+            <a:r>
+              <a:rPr lang="en-US" dirty="0"/>
+              <a:t>Put all data in one place</a:t>
+            </a:r>
+          </a:p>
+          <a:p>
+            <a:pPr marL="514350" indent="-514350">
+              <a:buFont typeface="+mj-lt"/>
+              <a:buAutoNum type="arabicPeriod"/>
+            </a:pPr>
+            <a:r>
+              <a:rPr lang="en-US" dirty="0"/>
+              <a:t>Build model on 1 ticker</a:t>
+            </a:r>
+          </a:p>
+          <a:p>
+            <a:pPr marL="514350" indent="-514350">
+              <a:buFont typeface="+mj-lt"/>
+              <a:buAutoNum type="arabicPeriod"/>
+            </a:pPr>
+            <a:r>
+              <a:rPr lang="en-US" dirty="0"/>
+              <a:t>Outline dashboard </a:t>
+            </a:r>
+            <a:r>
+              <a:rPr lang="en-US" b="1" dirty="0"/>
+              <a:t>✔</a:t>
+            </a:r>
+          </a:p>
+          <a:p>
+            <a:pPr marL="514350" indent="-514350">
+              <a:buFont typeface="+mj-lt"/>
+              <a:buAutoNum type="arabicPeriod"/>
+            </a:pPr>
+            <a:r>
+              <a:rPr lang="en-US" dirty="0"/>
+              <a:t>Git repo</a:t>
+            </a:r>
+          </a:p>
+          <a:p>
+            <a:pPr marL="514350" indent="-514350">
+              <a:buFont typeface="+mj-lt"/>
+              <a:buAutoNum type="arabicPeriod"/>
+            </a:pPr>
+            <a:endParaRPr lang="en-US" dirty="0"/>
+          </a:p>
+          <a:p>
+            <a:pPr marL="514350" indent="-514350">
+              <a:buFont typeface="+mj-lt"/>
+              <a:buAutoNum type="arabicPeriod"/>
+            </a:pPr>
+            <a:r>
+              <a:rPr lang="en-US" dirty="0"/>
+              <a:t>Define function to calculate volatility (vs. BTC)</a:t>
+            </a:r>
+          </a:p>
+          <a:p>
+            <a:pPr lvl="1"/>
+            <a:r>
+              <a:rPr lang="en-US" dirty="0"/>
+              <a:t>Decide time frame or make it a parameter</a:t>
+            </a:r>
+          </a:p>
+          <a:p>
+            <a:pPr marL="514350" indent="-514350">
+              <a:buFont typeface="+mj-lt"/>
+              <a:buAutoNum type="arabicPeriod"/>
+            </a:pPr>
+            <a:r>
+              <a:rPr lang="en-US" dirty="0"/>
+              <a:t>Define function to plot</a:t>
+            </a:r>
+          </a:p>
+          <a:p>
+            <a:pPr marL="514350" indent="-514350">
+              <a:buFont typeface="+mj-lt"/>
+              <a:buAutoNum type="arabicPeriod"/>
+            </a:pPr>
+            <a:r>
+              <a:rPr lang="en-US" dirty="0"/>
+              <a:t>Build the HTML</a:t>
+            </a:r>
+          </a:p>
+          <a:p>
+            <a:pPr marL="514350" indent="-514350">
+              <a:buFont typeface="+mj-lt"/>
+              <a:buAutoNum type="arabicPeriod"/>
+            </a:pPr>
+            <a:r>
+              <a:rPr lang="en-US" dirty="0"/>
+              <a:t>Explore </a:t>
+            </a:r>
             <a:r>
               <a:rPr lang="en-US" dirty="0" err="1"/>
               <a:t>yfinance</a:t>
             </a:r>
-            <a:endParaRPr lang="en-US" dirty="0"/>
-          </a:p>
-          <a:p>
-            <a:pPr lvl="1"/>
             <a:r>
               <a:rPr lang="en-US" dirty="0"/>
-              <a:t>Used for pulling historical data</a:t>
+              <a:t> </a:t>
             </a:r>
           </a:p>
         </p:txBody>
@@ -6761,7 +6847,7 @@
     </p:spTree>
     <p:extLst>
       <p:ext uri="{BB962C8B-B14F-4D97-AF65-F5344CB8AC3E}">
-        <p14:creationId xmlns:p14="http://schemas.microsoft.com/office/powerpoint/2010/main" val="2299318546"/>
+        <p14:creationId xmlns:p14="http://schemas.microsoft.com/office/powerpoint/2010/main" val="1172111218"/>
       </p:ext>
     </p:extLst>
   </p:cSld>

</xml_diff>